<commit_message>
Improved the slides (formatting)
</commit_message>
<xml_diff>
--- a/Courses/Applied-Programmer/Programming-Fundamentals/03-Масиви-и-списъци/10.Работа-с-масиви-въвеждане-извеждане.pptx
+++ b/Courses/Applied-Programmer/Programming-Fundamentals/03-Масиви-и-списъци/10.Работа-с-масиви-въвеждане-извеждане.pptx
@@ -349,7 +349,7 @@
             <a:fld id="{FE5B4EDC-59C0-49C7-8ADA-5A781B329E02}" type="datetimeFigureOut">
               <a:rPr lang="en-US"/>
               <a:pPr/>
-              <a:t>16-Dec-19</a:t>
+              <a:t>10-Nov-20</a:t>
             </a:fld>
             <a:endParaRPr dirty="0"/>
           </a:p>
@@ -647,7 +647,7 @@
             <a:fld id="{F2D8D46A-B586-417D-BFBD-8C8FE0AAF762}" type="datetimeFigureOut">
               <a:rPr lang="en-US" smtClean="0"/>
               <a:pPr/>
-              <a:t>16-Dec-19</a:t>
+              <a:t>10-Nov-20</a:t>
             </a:fld>
             <a:endParaRPr lang="en-US" dirty="0"/>
           </a:p>
@@ -7883,7 +7883,7 @@
         </p:nvGrpSpPr>
         <p:grpSpPr>
           <a:xfrm>
-            <a:off x="3679125" y="4210594"/>
+            <a:off x="3679125" y="4572000"/>
             <a:ext cx="4827398" cy="1733006"/>
             <a:chOff x="3629214" y="4058194"/>
             <a:chExt cx="4827398" cy="1733006"/>
@@ -8451,7 +8451,7 @@
         </p:nvSpPr>
         <p:spPr bwMode="auto">
           <a:xfrm>
-            <a:off x="836611" y="1162664"/>
+            <a:off x="836611" y="1317812"/>
             <a:ext cx="10591801" cy="4854388"/>
           </a:xfrm>
           <a:prstGeom prst="rect">
@@ -9566,7 +9566,7 @@
                 <a:spcPct val="100000"/>
               </a:lnSpc>
               <a:spcBef>
-                <a:spcPts val="1200"/>
+                <a:spcPts val="2400"/>
               </a:spcBef>
             </a:pPr>
             <a:r>
@@ -9591,9 +9591,6 @@
               <a:lnSpc>
                 <a:spcPct val="100000"/>
               </a:lnSpc>
-              <a:spcBef>
-                <a:spcPts val="1200"/>
-              </a:spcBef>
             </a:pPr>
             <a:endParaRPr lang="bg-BG" sz="3200" dirty="0">
               <a:solidFill>
@@ -9606,9 +9603,6 @@
               <a:lnSpc>
                 <a:spcPct val="100000"/>
               </a:lnSpc>
-              <a:spcBef>
-                <a:spcPts val="1200"/>
-              </a:spcBef>
             </a:pPr>
             <a:r>
               <a:rPr lang="bg-BG" sz="3200" dirty="0">
@@ -9686,7 +9680,7 @@
         </p:blipFill>
         <p:spPr>
           <a:xfrm>
-            <a:off x="8532812" y="1377743"/>
+            <a:off x="8747774" y="1151118"/>
             <a:ext cx="2209800" cy="1412018"/>
           </a:xfrm>
           <a:prstGeom prst="rect">
@@ -9741,7 +9735,7 @@
         </p:nvSpPr>
         <p:spPr>
           <a:xfrm>
-            <a:off x="608012" y="2990673"/>
+            <a:off x="608012" y="3018666"/>
             <a:ext cx="7181272" cy="945625"/>
           </a:xfrm>
           <a:prstGeom prst="rect">
@@ -10010,7 +10004,7 @@
         </p:nvSpPr>
         <p:spPr>
           <a:xfrm>
-            <a:off x="608012" y="4606591"/>
+            <a:off x="608012" y="4648200"/>
             <a:ext cx="3218872" cy="545516"/>
           </a:xfrm>
           <a:prstGeom prst="rect">
@@ -10260,7 +10254,7 @@
         </p:nvSpPr>
         <p:spPr>
           <a:xfrm>
-            <a:off x="608012" y="5802597"/>
+            <a:off x="608012" y="5943600"/>
             <a:ext cx="7181272" cy="545516"/>
           </a:xfrm>
           <a:prstGeom prst="rect">
@@ -11563,14 +11557,15 @@
           <a:p>
             <a:r>
               <a:rPr lang="bg-BG" dirty="0"/>
-              <a:t>Чрез</a:t>
-            </a:r>
-            <a:r>
-              <a:rPr lang="en-US" dirty="0"/>
-              <a:t>  </a:t>
+              <a:t>Чрез </a:t>
             </a:r>
             <a:r>
               <a:rPr lang="en-US" b="1" dirty="0">
+                <a:solidFill>
+                  <a:schemeClr val="tx2">
+                    <a:lumMod val="75000"/>
+                  </a:schemeClr>
+                </a:solidFill>
                 <a:latin typeface="Consolas" panose="020B0609020204030204" pitchFamily="49" charset="0"/>
               </a:rPr>
               <a:t>for</a:t>
@@ -11589,6 +11584,11 @@
             </a:r>
             <a:r>
               <a:rPr lang="en-US" b="1" noProof="1">
+                <a:solidFill>
+                  <a:schemeClr val="tx2">
+                    <a:lumMod val="75000"/>
+                  </a:schemeClr>
+                </a:solidFill>
                 <a:latin typeface="Consolas" panose="020B0609020204030204" pitchFamily="49" charset="0"/>
               </a:rPr>
               <a:t>String.Split()</a:t>
@@ -14905,10 +14905,6 @@
             <a:r>
               <a:rPr lang="bg-BG" dirty="0"/>
               <a:t>или </a:t>
-            </a:r>
-            <a:r>
-              <a:rPr lang="en-US" dirty="0"/>
-              <a:t> </a:t>
             </a:r>
             <a:r>
               <a:rPr lang="bg-BG" dirty="0">
@@ -16113,7 +16109,7 @@
         </p:nvSpPr>
         <p:spPr bwMode="auto">
           <a:xfrm>
-            <a:off x="1693862" y="2948013"/>
+            <a:off x="1693862" y="3329013"/>
             <a:ext cx="958799" cy="2538387"/>
           </a:xfrm>
           <a:prstGeom prst="rect">
@@ -16276,7 +16272,7 @@
         </p:nvSpPr>
         <p:spPr bwMode="auto">
           <a:xfrm>
-            <a:off x="3457180" y="2945003"/>
+            <a:off x="3457180" y="3326003"/>
             <a:ext cx="1978285" cy="2541397"/>
           </a:xfrm>
           <a:prstGeom prst="rect">
@@ -16356,7 +16352,7 @@
         </p:nvSpPr>
         <p:spPr>
           <a:xfrm>
-            <a:off x="2864420" y="3810624"/>
+            <a:off x="2864420" y="4191624"/>
             <a:ext cx="381000" cy="346180"/>
           </a:xfrm>
           <a:prstGeom prst="rightArrow">
@@ -16398,7 +16394,7 @@
         </p:nvSpPr>
         <p:spPr bwMode="auto">
           <a:xfrm>
-            <a:off x="6253144" y="2948013"/>
+            <a:off x="6253144" y="3329013"/>
             <a:ext cx="958799" cy="2538387"/>
           </a:xfrm>
           <a:prstGeom prst="rect">
@@ -16590,7 +16586,7 @@
         </p:nvSpPr>
         <p:spPr bwMode="auto">
           <a:xfrm>
-            <a:off x="8016462" y="2945003"/>
+            <a:off x="8016462" y="3326003"/>
             <a:ext cx="2478500" cy="2541397"/>
           </a:xfrm>
           <a:prstGeom prst="rect">
@@ -16670,7 +16666,7 @@
         </p:nvSpPr>
         <p:spPr>
           <a:xfrm>
-            <a:off x="7444163" y="4098674"/>
+            <a:off x="7444163" y="4479674"/>
             <a:ext cx="381000" cy="346180"/>
           </a:xfrm>
           <a:prstGeom prst="rightArrow">
@@ -16827,7 +16823,7 @@
         </p:nvSpPr>
         <p:spPr bwMode="auto">
           <a:xfrm>
-            <a:off x="796923" y="1905000"/>
+            <a:off x="796923" y="1524000"/>
             <a:ext cx="10591801" cy="4454278"/>
           </a:xfrm>
           <a:prstGeom prst="rect">

</xml_diff>